<commit_message>
7.CopySystem 예제 추가 :  Call ApiItem Group기능 대기
</commit_message>
<xml_diff>
--- a/DsDotNet/src/UnitTest/UnitTest.Engine/ImportPPT/5.Call.pptx
+++ b/DsDotNet/src/UnitTest/UnitTest.Engine/ImportPPT/5.Call.pptx
@@ -5,17 +5,16 @@
     <p:sldMasterId id="2147483648" r:id="rId1"/>
   </p:sldMasterIdLst>
   <p:notesMasterIdLst>
-    <p:notesMasterId r:id="rId7"/>
+    <p:notesMasterId r:id="rId6"/>
   </p:notesMasterIdLst>
   <p:handoutMasterIdLst>
-    <p:handoutMasterId r:id="rId8"/>
+    <p:handoutMasterId r:id="rId7"/>
   </p:handoutMasterIdLst>
   <p:sldIdLst>
     <p:sldId id="614" r:id="rId2"/>
     <p:sldId id="615" r:id="rId3"/>
     <p:sldId id="617" r:id="rId4"/>
-    <p:sldId id="618" r:id="rId5"/>
-    <p:sldId id="616" r:id="rId6"/>
+    <p:sldId id="616" r:id="rId5"/>
   </p:sldIdLst>
   <p:sldSz cx="12192000" cy="6858000"/>
   <p:notesSz cx="6797675" cy="9926638"/>
@@ -219,7 +218,7 @@
           <a:p>
             <a:fld id="{DD503887-5801-43A0-AEF9-041E8DDC2558}" type="datetimeFigureOut">
               <a:rPr lang="ko-KR" altLang="en-US" smtClean="0"/>
-              <a:t>2022-11-02</a:t>
+              <a:t>2022-11-03</a:t>
             </a:fld>
             <a:endParaRPr lang="ko-KR" altLang="en-US" dirty="0"/>
           </a:p>
@@ -396,7 +395,7 @@
           <a:p>
             <a:fld id="{95336A0E-57B1-4D4C-BD9B-2F72B5943464}" type="datetimeFigureOut">
               <a:rPr lang="ko-KR" altLang="en-US" smtClean="0"/>
-              <a:t>2022-11-02</a:t>
+              <a:t>2022-11-03</a:t>
             </a:fld>
             <a:endParaRPr lang="ko-KR" altLang="en-US" dirty="0"/>
           </a:p>
@@ -810,7 +809,7 @@
           <a:p>
             <a:fld id="{229D12C7-0FF5-4972-A033-474EFFC79F40}" type="datetime1">
               <a:rPr lang="ko-KR" altLang="en-US" smtClean="0"/>
-              <a:t>2022-11-02</a:t>
+              <a:t>2022-11-03</a:t>
             </a:fld>
             <a:endParaRPr lang="ko-KR" altLang="en-US" dirty="0"/>
           </a:p>
@@ -1008,7 +1007,7 @@
           <a:p>
             <a:fld id="{5BA19FD4-B052-4F56-8FD8-EAFD078DEFB0}" type="datetime1">
               <a:rPr lang="ko-KR" altLang="en-US" smtClean="0"/>
-              <a:t>2022-11-02</a:t>
+              <a:t>2022-11-03</a:t>
             </a:fld>
             <a:endParaRPr lang="ko-KR" altLang="en-US" dirty="0"/>
           </a:p>
@@ -1216,7 +1215,7 @@
           <a:p>
             <a:fld id="{024994B9-23A6-4B0A-A038-AC140E83DAA3}" type="datetime1">
               <a:rPr lang="ko-KR" altLang="en-US" smtClean="0"/>
-              <a:t>2022-11-02</a:t>
+              <a:t>2022-11-03</a:t>
             </a:fld>
             <a:endParaRPr lang="ko-KR" altLang="en-US" dirty="0"/>
           </a:p>
@@ -1414,7 +1413,7 @@
           <a:p>
             <a:fld id="{70D0DAB2-87CB-4028-B965-3AA710ADF2CB}" type="datetime1">
               <a:rPr lang="ko-KR" altLang="en-US" smtClean="0"/>
-              <a:t>2022-11-02</a:t>
+              <a:t>2022-11-03</a:t>
             </a:fld>
             <a:endParaRPr lang="ko-KR" altLang="en-US" dirty="0"/>
           </a:p>
@@ -1689,7 +1688,7 @@
           <a:p>
             <a:fld id="{63FA3D71-FEA8-477F-9D1E-EA860F411BC7}" type="datetime1">
               <a:rPr lang="ko-KR" altLang="en-US" smtClean="0"/>
-              <a:t>2022-11-02</a:t>
+              <a:t>2022-11-03</a:t>
             </a:fld>
             <a:endParaRPr lang="ko-KR" altLang="en-US" dirty="0"/>
           </a:p>
@@ -1954,7 +1953,7 @@
           <a:p>
             <a:fld id="{F58E3EF4-7980-4C97-BA64-EC66995BB574}" type="datetime1">
               <a:rPr lang="ko-KR" altLang="en-US" smtClean="0"/>
-              <a:t>2022-11-02</a:t>
+              <a:t>2022-11-03</a:t>
             </a:fld>
             <a:endParaRPr lang="ko-KR" altLang="en-US" dirty="0"/>
           </a:p>
@@ -2366,7 +2365,7 @@
           <a:p>
             <a:fld id="{FC9BC1D0-7D6B-4634-9D19-644040D74EAE}" type="datetime1">
               <a:rPr lang="ko-KR" altLang="en-US" smtClean="0"/>
-              <a:t>2022-11-02</a:t>
+              <a:t>2022-11-03</a:t>
             </a:fld>
             <a:endParaRPr lang="ko-KR" altLang="en-US" dirty="0"/>
           </a:p>
@@ -2508,7 +2507,7 @@
           <a:p>
             <a:fld id="{B5B1BBC2-B738-4C35-AEE5-660EB2DEB482}" type="datetime1">
               <a:rPr lang="ko-KR" altLang="en-US" smtClean="0"/>
-              <a:t>2022-11-02</a:t>
+              <a:t>2022-11-03</a:t>
             </a:fld>
             <a:endParaRPr lang="ko-KR" altLang="en-US" dirty="0"/>
           </a:p>
@@ -7090,7 +7089,7 @@
           <a:p>
             <a:fld id="{C60E9F93-7E77-4F36-B88C-A425F00C8D91}" type="datetime1">
               <a:rPr lang="ko-KR" altLang="en-US" smtClean="0"/>
-              <a:t>2022-11-02</a:t>
+              <a:t>2022-11-03</a:t>
             </a:fld>
             <a:endParaRPr lang="ko-KR" altLang="en-US" dirty="0"/>
           </a:p>
@@ -7401,7 +7400,7 @@
           <a:p>
             <a:fld id="{36BCCD0E-2A54-4016-BFFC-FEAABCDA6915}" type="datetime1">
               <a:rPr lang="ko-KR" altLang="en-US" smtClean="0"/>
-              <a:t>2022-11-02</a:t>
+              <a:t>2022-11-03</a:t>
             </a:fld>
             <a:endParaRPr lang="ko-KR" altLang="en-US" dirty="0"/>
           </a:p>
@@ -7689,7 +7688,7 @@
           <a:p>
             <a:fld id="{AAF69562-79F1-43EA-AE78-EAD8DB3AEC1A}" type="datetime1">
               <a:rPr lang="ko-KR" altLang="en-US" smtClean="0"/>
-              <a:t>2022-11-02</a:t>
+              <a:t>2022-11-03</a:t>
             </a:fld>
             <a:endParaRPr lang="ko-KR" altLang="en-US" dirty="0"/>
           </a:p>
@@ -7930,7 +7929,7 @@
           <a:p>
             <a:fld id="{C984B0C4-64BA-4E4C-B5E6-A51EE3F6ED95}" type="datetime1">
               <a:rPr lang="ko-KR" altLang="en-US" smtClean="0"/>
-              <a:t>2022-11-02</a:t>
+              <a:t>2022-11-03</a:t>
             </a:fld>
             <a:endParaRPr lang="ko-KR" altLang="en-US" dirty="0"/>
           </a:p>
@@ -9083,264 +9082,6 @@
 </file>
 
 <file path=ppt/slides/slide4.xml><?xml version="1.0" encoding="utf-8"?>
-<p:sld xmlns:a="http://schemas.openxmlformats.org/drawingml/2006/main" xmlns:r="http://schemas.openxmlformats.org/officeDocument/2006/relationships" xmlns:p="http://schemas.openxmlformats.org/presentationml/2006/main">
-  <p:cSld>
-    <p:spTree>
-      <p:nvGrpSpPr>
-        <p:cNvPr id="1" name=""/>
-        <p:cNvGrpSpPr/>
-        <p:nvPr/>
-      </p:nvGrpSpPr>
-      <p:grpSpPr>
-        <a:xfrm>
-          <a:off x="0" y="0"/>
-          <a:ext cx="0" cy="0"/>
-          <a:chOff x="0" y="0"/>
-          <a:chExt cx="0" cy="0"/>
-        </a:xfrm>
-      </p:grpSpPr>
-      <p:sp>
-        <p:nvSpPr>
-          <p:cNvPr id="2" name="제목 1">
-            <a:extLst>
-              <a:ext uri="{FF2B5EF4-FFF2-40B4-BE49-F238E27FC236}">
-                <a16:creationId xmlns:a16="http://schemas.microsoft.com/office/drawing/2014/main" id="{E35BEC89-0CFB-7F29-D8C7-71B3E64B4D66}"/>
-              </a:ext>
-            </a:extLst>
-          </p:cNvPr>
-          <p:cNvSpPr>
-            <a:spLocks noGrp="1"/>
-          </p:cNvSpPr>
-          <p:nvPr>
-            <p:ph type="title"/>
-          </p:nvPr>
-        </p:nvSpPr>
-        <p:spPr/>
-        <p:txBody>
-          <a:bodyPr/>
-          <a:lstStyle/>
-          <a:p>
-            <a:r>
-              <a:rPr lang="en-US" altLang="ko-KR" dirty="0"/>
-              <a:t>#103</a:t>
-            </a:r>
-            <a:endParaRPr lang="ko-KR" altLang="en-US" dirty="0"/>
-          </a:p>
-        </p:txBody>
-      </p:sp>
-      <p:sp>
-        <p:nvSpPr>
-          <p:cNvPr id="11" name="타원 10">
-            <a:extLst>
-              <a:ext uri="{FF2B5EF4-FFF2-40B4-BE49-F238E27FC236}">
-                <a16:creationId xmlns:a16="http://schemas.microsoft.com/office/drawing/2014/main" id="{A8DEAF01-6D94-28CA-7567-1D6E7A30C46B}"/>
-              </a:ext>
-            </a:extLst>
-          </p:cNvPr>
-          <p:cNvSpPr/>
-          <p:nvPr/>
-        </p:nvSpPr>
-        <p:spPr>
-          <a:xfrm>
-            <a:off x="3571875" y="3305175"/>
-            <a:ext cx="1733550" cy="952500"/>
-          </a:xfrm>
-          <a:prstGeom prst="ellipse">
-            <a:avLst/>
-          </a:prstGeom>
-        </p:spPr>
-        <p:style>
-          <a:lnRef idx="2">
-            <a:schemeClr val="accent1">
-              <a:shade val="50000"/>
-            </a:schemeClr>
-          </a:lnRef>
-          <a:fillRef idx="1">
-            <a:schemeClr val="accent1"/>
-          </a:fillRef>
-          <a:effectRef idx="0">
-            <a:schemeClr val="accent1"/>
-          </a:effectRef>
-          <a:fontRef idx="minor">
-            <a:schemeClr val="lt1"/>
-          </a:fontRef>
-        </p:style>
-        <p:txBody>
-          <a:bodyPr rtlCol="0" anchor="ctr"/>
-          <a:lstStyle/>
-          <a:p>
-            <a:pPr algn="ctr"/>
-            <a:r>
-              <a:rPr lang="en-US" altLang="ko-KR" dirty="0"/>
-              <a:t>newSys1.Func1</a:t>
-            </a:r>
-            <a:endParaRPr lang="ko-KR" altLang="en-US" dirty="0"/>
-          </a:p>
-        </p:txBody>
-      </p:sp>
-      <p:sp>
-        <p:nvSpPr>
-          <p:cNvPr id="12" name="타원 11">
-            <a:extLst>
-              <a:ext uri="{FF2B5EF4-FFF2-40B4-BE49-F238E27FC236}">
-                <a16:creationId xmlns:a16="http://schemas.microsoft.com/office/drawing/2014/main" id="{97830B60-D108-9F85-29FC-869E4BDC5485}"/>
-              </a:ext>
-            </a:extLst>
-          </p:cNvPr>
-          <p:cNvSpPr/>
-          <p:nvPr/>
-        </p:nvSpPr>
-        <p:spPr>
-          <a:xfrm>
-            <a:off x="6410325" y="3257550"/>
-            <a:ext cx="1733550" cy="1047750"/>
-          </a:xfrm>
-          <a:prstGeom prst="ellipse">
-            <a:avLst/>
-          </a:prstGeom>
-        </p:spPr>
-        <p:style>
-          <a:lnRef idx="2">
-            <a:schemeClr val="accent1">
-              <a:shade val="50000"/>
-            </a:schemeClr>
-          </a:lnRef>
-          <a:fillRef idx="1">
-            <a:schemeClr val="accent1"/>
-          </a:fillRef>
-          <a:effectRef idx="0">
-            <a:schemeClr val="accent1"/>
-          </a:effectRef>
-          <a:fontRef idx="minor">
-            <a:schemeClr val="lt1"/>
-          </a:fontRef>
-        </p:style>
-        <p:txBody>
-          <a:bodyPr rtlCol="0" anchor="ctr"/>
-          <a:lstStyle/>
-          <a:p>
-            <a:pPr algn="ctr"/>
-            <a:r>
-              <a:rPr lang="en-US" altLang="ko-KR" dirty="0"/>
-              <a:t>newSys1.Func2</a:t>
-            </a:r>
-            <a:endParaRPr lang="ko-KR" altLang="en-US" dirty="0"/>
-          </a:p>
-        </p:txBody>
-      </p:sp>
-      <p:cxnSp>
-        <p:nvCxnSpPr>
-          <p:cNvPr id="21" name="직선 화살표 연결선 20">
-            <a:extLst>
-              <a:ext uri="{FF2B5EF4-FFF2-40B4-BE49-F238E27FC236}">
-                <a16:creationId xmlns:a16="http://schemas.microsoft.com/office/drawing/2014/main" id="{C185348E-B572-B6EF-E74B-589916BD9919}"/>
-              </a:ext>
-            </a:extLst>
-          </p:cNvPr>
-          <p:cNvCxnSpPr>
-            <a:stCxn id="11" idx="6"/>
-            <a:endCxn id="12" idx="2"/>
-          </p:cNvCxnSpPr>
-          <p:nvPr/>
-        </p:nvCxnSpPr>
-        <p:spPr>
-          <a:xfrm>
-            <a:off x="5305425" y="3781425"/>
-            <a:ext cx="1104900" cy="0"/>
-          </a:xfrm>
-          <a:prstGeom prst="straightConnector1">
-            <a:avLst/>
-          </a:prstGeom>
-          <a:ln>
-            <a:tailEnd type="triangle"/>
-          </a:ln>
-        </p:spPr>
-        <p:style>
-          <a:lnRef idx="1">
-            <a:schemeClr val="accent1"/>
-          </a:lnRef>
-          <a:fillRef idx="0">
-            <a:schemeClr val="accent1"/>
-          </a:fillRef>
-          <a:effectRef idx="0">
-            <a:schemeClr val="accent1"/>
-          </a:effectRef>
-          <a:fontRef idx="minor">
-            <a:schemeClr val="tx1"/>
-          </a:fontRef>
-        </p:style>
-      </p:cxnSp>
-      <p:sp>
-        <p:nvSpPr>
-          <p:cNvPr id="3" name="사각형: 모서리가 접힌 도형 2">
-            <a:extLst>
-              <a:ext uri="{FF2B5EF4-FFF2-40B4-BE49-F238E27FC236}">
-                <a16:creationId xmlns:a16="http://schemas.microsoft.com/office/drawing/2014/main" id="{97138181-7081-3F3D-76E0-0ED2EB82EE7F}"/>
-              </a:ext>
-            </a:extLst>
-          </p:cNvPr>
-          <p:cNvSpPr/>
-          <p:nvPr/>
-        </p:nvSpPr>
-        <p:spPr>
-          <a:xfrm>
-            <a:off x="697523" y="5328138"/>
-            <a:ext cx="1752600" cy="1055077"/>
-          </a:xfrm>
-          <a:prstGeom prst="foldedCorner">
-            <a:avLst/>
-          </a:prstGeom>
-        </p:spPr>
-        <p:style>
-          <a:lnRef idx="2">
-            <a:schemeClr val="accent1">
-              <a:shade val="50000"/>
-            </a:schemeClr>
-          </a:lnRef>
-          <a:fillRef idx="1">
-            <a:schemeClr val="accent1"/>
-          </a:fillRef>
-          <a:effectRef idx="0">
-            <a:schemeClr val="accent1"/>
-          </a:effectRef>
-          <a:fontRef idx="minor">
-            <a:schemeClr val="lt1"/>
-          </a:fontRef>
-        </p:style>
-        <p:txBody>
-          <a:bodyPr rtlCol="0" anchor="ctr"/>
-          <a:lstStyle/>
-          <a:p>
-            <a:pPr algn="ctr"/>
-            <a:r>
-              <a:rPr lang="en-US" altLang="ko-KR" dirty="0"/>
-              <a:t>SystemA</a:t>
-            </a:r>
-          </a:p>
-          <a:p>
-            <a:pPr algn="ctr"/>
-            <a:r>
-              <a:rPr lang="en-US" altLang="ko-KR" dirty="0"/>
-              <a:t>[newSys1]</a:t>
-            </a:r>
-            <a:endParaRPr lang="ko-KR" altLang="en-US" dirty="0"/>
-          </a:p>
-        </p:txBody>
-      </p:sp>
-    </p:spTree>
-    <p:extLst>
-      <p:ext uri="{BB962C8B-B14F-4D97-AF65-F5344CB8AC3E}">
-        <p14:creationId xmlns:p14="http://schemas.microsoft.com/office/powerpoint/2010/main" val="2203551289"/>
-      </p:ext>
-    </p:extLst>
-  </p:cSld>
-  <p:clrMapOvr>
-    <a:masterClrMapping/>
-  </p:clrMapOvr>
-</p:sld>
-</file>
-
-<file path=ppt/slides/slide5.xml><?xml version="1.0" encoding="utf-8"?>
 <p:sld xmlns:a="http://schemas.openxmlformats.org/drawingml/2006/main" xmlns:r="http://schemas.openxmlformats.org/officeDocument/2006/relationships" xmlns:p="http://schemas.openxmlformats.org/presentationml/2006/main">
   <p:cSld>
     <p:spTree>

</xml_diff>